<commit_message>
ios-android: Day 29 challenge and basic simulation OBserver pattern
</commit_message>
<xml_diff>
--- a/miniaturas.pptx
+++ b/miniaturas.pptx
@@ -6,6 +6,7 @@
   </p:sldMasterIdLst>
   <p:sldIdLst>
     <p:sldId id="256" r:id="rId2"/>
+    <p:sldId id="257" r:id="rId3"/>
   </p:sldIdLst>
   <p:sldSz cx="12192000" cy="6858000"/>
   <p:notesSz cx="6858000" cy="9144000"/>
@@ -104,6 +105,11 @@
       </a:defRPr>
     </a:lvl9pPr>
   </p:defaultTextStyle>
+  <p:extLst>
+    <p:ext uri="{EFAFB233-063F-42B5-8137-9DF3F51BA10A}">
+      <p15:sldGuideLst xmlns:p15="http://schemas.microsoft.com/office/powerpoint/2012/main"/>
+    </p:ext>
+  </p:extLst>
 </p:presentation>
 </file>
 
@@ -238,7 +244,7 @@
           <a:p>
             <a:fld id="{6355CDCD-8674-477D-B117-7BEE6A623F92}" type="datetimeFigureOut">
               <a:rPr lang="es-MX" smtClean="0"/>
-              <a:t>14/01/2025</a:t>
+              <a:t>16/01/2025</a:t>
             </a:fld>
             <a:endParaRPr lang="es-MX"/>
           </a:p>
@@ -408,7 +414,7 @@
           <a:p>
             <a:fld id="{6355CDCD-8674-477D-B117-7BEE6A623F92}" type="datetimeFigureOut">
               <a:rPr lang="es-MX" smtClean="0"/>
-              <a:t>14/01/2025</a:t>
+              <a:t>16/01/2025</a:t>
             </a:fld>
             <a:endParaRPr lang="es-MX"/>
           </a:p>
@@ -588,7 +594,7 @@
           <a:p>
             <a:fld id="{6355CDCD-8674-477D-B117-7BEE6A623F92}" type="datetimeFigureOut">
               <a:rPr lang="es-MX" smtClean="0"/>
-              <a:t>14/01/2025</a:t>
+              <a:t>16/01/2025</a:t>
             </a:fld>
             <a:endParaRPr lang="es-MX"/>
           </a:p>
@@ -758,7 +764,7 @@
           <a:p>
             <a:fld id="{6355CDCD-8674-477D-B117-7BEE6A623F92}" type="datetimeFigureOut">
               <a:rPr lang="es-MX" smtClean="0"/>
-              <a:t>14/01/2025</a:t>
+              <a:t>16/01/2025</a:t>
             </a:fld>
             <a:endParaRPr lang="es-MX"/>
           </a:p>
@@ -1004,7 +1010,7 @@
           <a:p>
             <a:fld id="{6355CDCD-8674-477D-B117-7BEE6A623F92}" type="datetimeFigureOut">
               <a:rPr lang="es-MX" smtClean="0"/>
-              <a:t>14/01/2025</a:t>
+              <a:t>16/01/2025</a:t>
             </a:fld>
             <a:endParaRPr lang="es-MX"/>
           </a:p>
@@ -1236,7 +1242,7 @@
           <a:p>
             <a:fld id="{6355CDCD-8674-477D-B117-7BEE6A623F92}" type="datetimeFigureOut">
               <a:rPr lang="es-MX" smtClean="0"/>
-              <a:t>14/01/2025</a:t>
+              <a:t>16/01/2025</a:t>
             </a:fld>
             <a:endParaRPr lang="es-MX"/>
           </a:p>
@@ -1603,7 +1609,7 @@
           <a:p>
             <a:fld id="{6355CDCD-8674-477D-B117-7BEE6A623F92}" type="datetimeFigureOut">
               <a:rPr lang="es-MX" smtClean="0"/>
-              <a:t>14/01/2025</a:t>
+              <a:t>16/01/2025</a:t>
             </a:fld>
             <a:endParaRPr lang="es-MX"/>
           </a:p>
@@ -1721,7 +1727,7 @@
           <a:p>
             <a:fld id="{6355CDCD-8674-477D-B117-7BEE6A623F92}" type="datetimeFigureOut">
               <a:rPr lang="es-MX" smtClean="0"/>
-              <a:t>14/01/2025</a:t>
+              <a:t>16/01/2025</a:t>
             </a:fld>
             <a:endParaRPr lang="es-MX"/>
           </a:p>
@@ -1816,7 +1822,7 @@
           <a:p>
             <a:fld id="{6355CDCD-8674-477D-B117-7BEE6A623F92}" type="datetimeFigureOut">
               <a:rPr lang="es-MX" smtClean="0"/>
-              <a:t>14/01/2025</a:t>
+              <a:t>16/01/2025</a:t>
             </a:fld>
             <a:endParaRPr lang="es-MX"/>
           </a:p>
@@ -2093,7 +2099,7 @@
           <a:p>
             <a:fld id="{6355CDCD-8674-477D-B117-7BEE6A623F92}" type="datetimeFigureOut">
               <a:rPr lang="es-MX" smtClean="0"/>
-              <a:t>14/01/2025</a:t>
+              <a:t>16/01/2025</a:t>
             </a:fld>
             <a:endParaRPr lang="es-MX"/>
           </a:p>
@@ -2350,7 +2356,7 @@
           <a:p>
             <a:fld id="{6355CDCD-8674-477D-B117-7BEE6A623F92}" type="datetimeFigureOut">
               <a:rPr lang="es-MX" smtClean="0"/>
-              <a:t>14/01/2025</a:t>
+              <a:t>16/01/2025</a:t>
             </a:fld>
             <a:endParaRPr lang="es-MX"/>
           </a:p>
@@ -2563,7 +2569,7 @@
           <a:p>
             <a:fld id="{6355CDCD-8674-477D-B117-7BEE6A623F92}" type="datetimeFigureOut">
               <a:rPr lang="es-MX" smtClean="0"/>
-              <a:t>14/01/2025</a:t>
+              <a:t>16/01/2025</a:t>
             </a:fld>
             <a:endParaRPr lang="es-MX"/>
           </a:p>
@@ -3413,6 +3419,266 @@
 </p:sld>
 </file>
 
+<file path=ppt/slides/slide2.xml><?xml version="1.0" encoding="utf-8"?>
+<p:sld xmlns:a="http://schemas.openxmlformats.org/drawingml/2006/main" xmlns:r="http://schemas.openxmlformats.org/officeDocument/2006/relationships" xmlns:p="http://schemas.openxmlformats.org/presentationml/2006/main">
+  <p:cSld>
+    <p:spTree>
+      <p:nvGrpSpPr>
+        <p:cNvPr id="1" name="">
+          <a:extLst>
+            <a:ext uri="{FF2B5EF4-FFF2-40B4-BE49-F238E27FC236}">
+              <a16:creationId xmlns:a16="http://schemas.microsoft.com/office/drawing/2014/main" id="{D2A42E0F-DB42-93A3-FB94-B219FE1D197E}"/>
+            </a:ext>
+          </a:extLst>
+        </p:cNvPr>
+        <p:cNvGrpSpPr/>
+        <p:nvPr/>
+      </p:nvGrpSpPr>
+      <p:grpSpPr>
+        <a:xfrm>
+          <a:off x="0" y="0"/>
+          <a:ext cx="0" cy="0"/>
+          <a:chOff x="0" y="0"/>
+          <a:chExt cx="0" cy="0"/>
+        </a:xfrm>
+      </p:grpSpPr>
+      <p:pic>
+        <p:nvPicPr>
+          <p:cNvPr id="2" name="Picture 2" descr="Implementing your first Android lint rule | by Fábio | ProAndroidDev">
+            <a:extLst>
+              <a:ext uri="{FF2B5EF4-FFF2-40B4-BE49-F238E27FC236}">
+                <a16:creationId xmlns:a16="http://schemas.microsoft.com/office/drawing/2014/main" id="{7EFE7648-12FB-3FB2-0E3D-51C9DC449108}"/>
+              </a:ext>
+            </a:extLst>
+          </p:cNvPr>
+          <p:cNvPicPr>
+            <a:picLocks noChangeAspect="1" noChangeArrowheads="1"/>
+          </p:cNvPicPr>
+          <p:nvPr/>
+        </p:nvPicPr>
+        <p:blipFill>
+          <a:blip r:embed="rId2">
+            <a:alphaModFix amt="33000"/>
+            <a:extLst>
+              <a:ext uri="{28A0092B-C50C-407E-A947-70E740481C1C}">
+                <a14:useLocalDpi xmlns:a14="http://schemas.microsoft.com/office/drawing/2010/main" val="0"/>
+              </a:ext>
+            </a:extLst>
+          </a:blip>
+          <a:srcRect/>
+          <a:stretch>
+            <a:fillRect/>
+          </a:stretch>
+        </p:blipFill>
+        <p:spPr bwMode="auto">
+          <a:xfrm flipH="1">
+            <a:off x="-3879888" y="-662575"/>
+            <a:ext cx="16195711" cy="7587250"/>
+          </a:xfrm>
+          <a:prstGeom prst="rect">
+            <a:avLst/>
+          </a:prstGeom>
+          <a:noFill/>
+          <a:extLst>
+            <a:ext uri="{909E8E84-426E-40DD-AFC4-6F175D3DCCD1}">
+              <a14:hiddenFill xmlns:a14="http://schemas.microsoft.com/office/drawing/2010/main">
+                <a:solidFill>
+                  <a:srgbClr val="FFFFFF"/>
+                </a:solidFill>
+              </a14:hiddenFill>
+            </a:ext>
+          </a:extLst>
+        </p:spPr>
+      </p:pic>
+      <p:sp>
+        <p:nvSpPr>
+          <p:cNvPr id="9" name="CuadroTexto 8">
+            <a:extLst>
+              <a:ext uri="{FF2B5EF4-FFF2-40B4-BE49-F238E27FC236}">
+                <a16:creationId xmlns:a16="http://schemas.microsoft.com/office/drawing/2014/main" id="{517EDCD6-0CA1-274F-DB2F-F56858FD2CFD}"/>
+              </a:ext>
+            </a:extLst>
+          </p:cNvPr>
+          <p:cNvSpPr txBox="1"/>
+          <p:nvPr/>
+        </p:nvSpPr>
+        <p:spPr>
+          <a:xfrm>
+            <a:off x="2227099" y="776418"/>
+            <a:ext cx="9696190" cy="584775"/>
+          </a:xfrm>
+          <a:prstGeom prst="rect">
+            <a:avLst/>
+          </a:prstGeom>
+          <a:noFill/>
+        </p:spPr>
+        <p:txBody>
+          <a:bodyPr wrap="square" rtlCol="0">
+            <a:spAutoFit/>
+          </a:bodyPr>
+          <a:lstStyle/>
+          <a:p>
+            <a:r>
+              <a:rPr lang="en-US" sz="3200" b="1" dirty="0">
+                <a:ln>
+                  <a:solidFill>
+                    <a:schemeClr val="bg1"/>
+                  </a:solidFill>
+                </a:ln>
+                <a:latin typeface="Arial" panose="020B0604020202020204" pitchFamily="34" charset="0"/>
+                <a:cs typeface="Arial" panose="020B0604020202020204" pitchFamily="34" charset="0"/>
+              </a:rPr>
+              <a:t>Create a custom method level Lint rule - Android</a:t>
+            </a:r>
+            <a:endParaRPr lang="es-MX" sz="3200" b="1" dirty="0">
+              <a:ln>
+                <a:solidFill>
+                  <a:schemeClr val="bg1"/>
+                </a:solidFill>
+              </a:ln>
+              <a:latin typeface="Arial" panose="020B0604020202020204" pitchFamily="34" charset="0"/>
+              <a:cs typeface="Arial" panose="020B0604020202020204" pitchFamily="34" charset="0"/>
+            </a:endParaRPr>
+          </a:p>
+        </p:txBody>
+      </p:sp>
+      <p:pic>
+        <p:nvPicPr>
+          <p:cNvPr id="4" name="Imagen 3">
+            <a:extLst>
+              <a:ext uri="{FF2B5EF4-FFF2-40B4-BE49-F238E27FC236}">
+                <a16:creationId xmlns:a16="http://schemas.microsoft.com/office/drawing/2014/main" id="{F668FB44-957E-F0C5-78C9-F1DC7EAAE4D8}"/>
+              </a:ext>
+            </a:extLst>
+          </p:cNvPr>
+          <p:cNvPicPr>
+            <a:picLocks noChangeAspect="1"/>
+          </p:cNvPicPr>
+          <p:nvPr/>
+        </p:nvPicPr>
+        <p:blipFill>
+          <a:blip r:embed="rId3"/>
+          <a:stretch>
+            <a:fillRect/>
+          </a:stretch>
+        </p:blipFill>
+        <p:spPr>
+          <a:xfrm>
+            <a:off x="2997696" y="1787193"/>
+            <a:ext cx="8407741" cy="4519830"/>
+          </a:xfrm>
+          <a:prstGeom prst="rect">
+            <a:avLst/>
+          </a:prstGeom>
+        </p:spPr>
+      </p:pic>
+      <p:pic>
+        <p:nvPicPr>
+          <p:cNvPr id="6" name="Picture 4" descr="Android icon SVG Vector &amp; PNG Free Download | UXWing">
+            <a:extLst>
+              <a:ext uri="{FF2B5EF4-FFF2-40B4-BE49-F238E27FC236}">
+                <a16:creationId xmlns:a16="http://schemas.microsoft.com/office/drawing/2014/main" id="{D1A96225-2B31-C851-5F19-D2C2B188BF21}"/>
+              </a:ext>
+            </a:extLst>
+          </p:cNvPr>
+          <p:cNvPicPr>
+            <a:picLocks noChangeAspect="1" noChangeArrowheads="1"/>
+          </p:cNvPicPr>
+          <p:nvPr/>
+        </p:nvPicPr>
+        <p:blipFill>
+          <a:blip r:embed="rId4">
+            <a:extLst>
+              <a:ext uri="{28A0092B-C50C-407E-A947-70E740481C1C}">
+                <a14:useLocalDpi xmlns:a14="http://schemas.microsoft.com/office/drawing/2010/main" val="0"/>
+              </a:ext>
+            </a:extLst>
+          </a:blip>
+          <a:srcRect/>
+          <a:stretch>
+            <a:fillRect/>
+          </a:stretch>
+        </p:blipFill>
+        <p:spPr bwMode="auto">
+          <a:xfrm>
+            <a:off x="666983" y="376142"/>
+            <a:ext cx="1117600" cy="1117600"/>
+          </a:xfrm>
+          <a:prstGeom prst="rect">
+            <a:avLst/>
+          </a:prstGeom>
+          <a:noFill/>
+          <a:extLst>
+            <a:ext uri="{909E8E84-426E-40DD-AFC4-6F175D3DCCD1}">
+              <a14:hiddenFill xmlns:a14="http://schemas.microsoft.com/office/drawing/2010/main">
+                <a:solidFill>
+                  <a:srgbClr val="FFFFFF"/>
+                </a:solidFill>
+              </a14:hiddenFill>
+            </a:ext>
+          </a:extLst>
+        </p:spPr>
+      </p:pic>
+      <p:pic>
+        <p:nvPicPr>
+          <p:cNvPr id="11" name="Picture 8" descr="Android Studio – Wikipedia">
+            <a:extLst>
+              <a:ext uri="{FF2B5EF4-FFF2-40B4-BE49-F238E27FC236}">
+                <a16:creationId xmlns:a16="http://schemas.microsoft.com/office/drawing/2014/main" id="{042FFEBE-E0CA-0650-1D63-6AF645E02FF3}"/>
+              </a:ext>
+            </a:extLst>
+          </p:cNvPr>
+          <p:cNvPicPr>
+            <a:picLocks noChangeAspect="1" noChangeArrowheads="1"/>
+          </p:cNvPicPr>
+          <p:nvPr/>
+        </p:nvPicPr>
+        <p:blipFill>
+          <a:blip r:embed="rId5">
+            <a:extLst>
+              <a:ext uri="{28A0092B-C50C-407E-A947-70E740481C1C}">
+                <a14:useLocalDpi xmlns:a14="http://schemas.microsoft.com/office/drawing/2010/main" val="0"/>
+              </a:ext>
+            </a:extLst>
+          </a:blip>
+          <a:srcRect/>
+          <a:stretch>
+            <a:fillRect/>
+          </a:stretch>
+        </p:blipFill>
+        <p:spPr bwMode="auto">
+          <a:xfrm>
+            <a:off x="727424" y="1493742"/>
+            <a:ext cx="996717" cy="996717"/>
+          </a:xfrm>
+          <a:prstGeom prst="rect">
+            <a:avLst/>
+          </a:prstGeom>
+          <a:noFill/>
+          <a:extLst>
+            <a:ext uri="{909E8E84-426E-40DD-AFC4-6F175D3DCCD1}">
+              <a14:hiddenFill xmlns:a14="http://schemas.microsoft.com/office/drawing/2010/main">
+                <a:solidFill>
+                  <a:srgbClr val="FFFFFF"/>
+                </a:solidFill>
+              </a14:hiddenFill>
+            </a:ext>
+          </a:extLst>
+        </p:spPr>
+      </p:pic>
+    </p:spTree>
+    <p:extLst>
+      <p:ext uri="{BB962C8B-B14F-4D97-AF65-F5344CB8AC3E}">
+        <p14:creationId xmlns:p14="http://schemas.microsoft.com/office/powerpoint/2010/main" val="2574810383"/>
+      </p:ext>
+    </p:extLst>
+  </p:cSld>
+  <p:clrMapOvr>
+    <a:masterClrMapping/>
+  </p:clrMapOvr>
+</p:sld>
+</file>
+
 <file path=ppt/theme/theme1.xml><?xml version="1.0" encoding="utf-8"?>
 <a:theme xmlns:a="http://schemas.openxmlformats.org/drawingml/2006/main" name="Tema de Office">
   <a:themeElements>

</xml_diff>

<commit_message>
iOS: Day 39 100 days challenge
</commit_message>
<xml_diff>
--- a/miniaturas.pptx
+++ b/miniaturas.pptx
@@ -7,6 +7,7 @@
   <p:sldIdLst>
     <p:sldId id="256" r:id="rId2"/>
     <p:sldId id="257" r:id="rId3"/>
+    <p:sldId id="258" r:id="rId4"/>
   </p:sldIdLst>
   <p:sldSz cx="12192000" cy="6858000"/>
   <p:notesSz cx="6858000" cy="9144000"/>
@@ -244,7 +245,7 @@
           <a:p>
             <a:fld id="{6355CDCD-8674-477D-B117-7BEE6A623F92}" type="datetimeFigureOut">
               <a:rPr lang="es-MX" smtClean="0"/>
-              <a:t>16/01/2025</a:t>
+              <a:t>21/01/2025</a:t>
             </a:fld>
             <a:endParaRPr lang="es-MX"/>
           </a:p>
@@ -414,7 +415,7 @@
           <a:p>
             <a:fld id="{6355CDCD-8674-477D-B117-7BEE6A623F92}" type="datetimeFigureOut">
               <a:rPr lang="es-MX" smtClean="0"/>
-              <a:t>16/01/2025</a:t>
+              <a:t>21/01/2025</a:t>
             </a:fld>
             <a:endParaRPr lang="es-MX"/>
           </a:p>
@@ -594,7 +595,7 @@
           <a:p>
             <a:fld id="{6355CDCD-8674-477D-B117-7BEE6A623F92}" type="datetimeFigureOut">
               <a:rPr lang="es-MX" smtClean="0"/>
-              <a:t>16/01/2025</a:t>
+              <a:t>21/01/2025</a:t>
             </a:fld>
             <a:endParaRPr lang="es-MX"/>
           </a:p>
@@ -764,7 +765,7 @@
           <a:p>
             <a:fld id="{6355CDCD-8674-477D-B117-7BEE6A623F92}" type="datetimeFigureOut">
               <a:rPr lang="es-MX" smtClean="0"/>
-              <a:t>16/01/2025</a:t>
+              <a:t>21/01/2025</a:t>
             </a:fld>
             <a:endParaRPr lang="es-MX"/>
           </a:p>
@@ -1010,7 +1011,7 @@
           <a:p>
             <a:fld id="{6355CDCD-8674-477D-B117-7BEE6A623F92}" type="datetimeFigureOut">
               <a:rPr lang="es-MX" smtClean="0"/>
-              <a:t>16/01/2025</a:t>
+              <a:t>21/01/2025</a:t>
             </a:fld>
             <a:endParaRPr lang="es-MX"/>
           </a:p>
@@ -1242,7 +1243,7 @@
           <a:p>
             <a:fld id="{6355CDCD-8674-477D-B117-7BEE6A623F92}" type="datetimeFigureOut">
               <a:rPr lang="es-MX" smtClean="0"/>
-              <a:t>16/01/2025</a:t>
+              <a:t>21/01/2025</a:t>
             </a:fld>
             <a:endParaRPr lang="es-MX"/>
           </a:p>
@@ -1609,7 +1610,7 @@
           <a:p>
             <a:fld id="{6355CDCD-8674-477D-B117-7BEE6A623F92}" type="datetimeFigureOut">
               <a:rPr lang="es-MX" smtClean="0"/>
-              <a:t>16/01/2025</a:t>
+              <a:t>21/01/2025</a:t>
             </a:fld>
             <a:endParaRPr lang="es-MX"/>
           </a:p>
@@ -1727,7 +1728,7 @@
           <a:p>
             <a:fld id="{6355CDCD-8674-477D-B117-7BEE6A623F92}" type="datetimeFigureOut">
               <a:rPr lang="es-MX" smtClean="0"/>
-              <a:t>16/01/2025</a:t>
+              <a:t>21/01/2025</a:t>
             </a:fld>
             <a:endParaRPr lang="es-MX"/>
           </a:p>
@@ -1822,7 +1823,7 @@
           <a:p>
             <a:fld id="{6355CDCD-8674-477D-B117-7BEE6A623F92}" type="datetimeFigureOut">
               <a:rPr lang="es-MX" smtClean="0"/>
-              <a:t>16/01/2025</a:t>
+              <a:t>21/01/2025</a:t>
             </a:fld>
             <a:endParaRPr lang="es-MX"/>
           </a:p>
@@ -2099,7 +2100,7 @@
           <a:p>
             <a:fld id="{6355CDCD-8674-477D-B117-7BEE6A623F92}" type="datetimeFigureOut">
               <a:rPr lang="es-MX" smtClean="0"/>
-              <a:t>16/01/2025</a:t>
+              <a:t>21/01/2025</a:t>
             </a:fld>
             <a:endParaRPr lang="es-MX"/>
           </a:p>
@@ -2356,7 +2357,7 @@
           <a:p>
             <a:fld id="{6355CDCD-8674-477D-B117-7BEE6A623F92}" type="datetimeFigureOut">
               <a:rPr lang="es-MX" smtClean="0"/>
-              <a:t>16/01/2025</a:t>
+              <a:t>21/01/2025</a:t>
             </a:fld>
             <a:endParaRPr lang="es-MX"/>
           </a:p>
@@ -2569,7 +2570,7 @@
           <a:p>
             <a:fld id="{6355CDCD-8674-477D-B117-7BEE6A623F92}" type="datetimeFigureOut">
               <a:rPr lang="es-MX" smtClean="0"/>
-              <a:t>16/01/2025</a:t>
+              <a:t>21/01/2025</a:t>
             </a:fld>
             <a:endParaRPr lang="es-MX"/>
           </a:p>
@@ -3679,6 +3680,396 @@
 </p:sld>
 </file>
 
+<file path=ppt/slides/slide3.xml><?xml version="1.0" encoding="utf-8"?>
+<p:sld xmlns:a="http://schemas.openxmlformats.org/drawingml/2006/main" xmlns:r="http://schemas.openxmlformats.org/officeDocument/2006/relationships" xmlns:p="http://schemas.openxmlformats.org/presentationml/2006/main">
+  <p:cSld>
+    <p:spTree>
+      <p:nvGrpSpPr>
+        <p:cNvPr id="1" name=""/>
+        <p:cNvGrpSpPr/>
+        <p:nvPr/>
+      </p:nvGrpSpPr>
+      <p:grpSpPr>
+        <a:xfrm>
+          <a:off x="0" y="0"/>
+          <a:ext cx="0" cy="0"/>
+          <a:chOff x="0" y="0"/>
+          <a:chExt cx="0" cy="0"/>
+        </a:xfrm>
+      </p:grpSpPr>
+      <p:pic>
+        <p:nvPicPr>
+          <p:cNvPr id="1026" name="Picture 2" descr="What's new in UIKit and iOS - Discover - Apple Developer">
+            <a:extLst>
+              <a:ext uri="{FF2B5EF4-FFF2-40B4-BE49-F238E27FC236}">
+                <a16:creationId xmlns:a16="http://schemas.microsoft.com/office/drawing/2014/main" id="{6B5B976A-9236-B4FF-F20D-66DF2B6AD7E4}"/>
+              </a:ext>
+            </a:extLst>
+          </p:cNvPr>
+          <p:cNvPicPr>
+            <a:picLocks noChangeAspect="1" noChangeArrowheads="1"/>
+          </p:cNvPicPr>
+          <p:nvPr/>
+        </p:nvPicPr>
+        <p:blipFill>
+          <a:blip r:embed="rId2">
+            <a:alphaModFix amt="33000"/>
+            <a:extLst>
+              <a:ext uri="{28A0092B-C50C-407E-A947-70E740481C1C}">
+                <a14:useLocalDpi xmlns:a14="http://schemas.microsoft.com/office/drawing/2010/main" val="0"/>
+              </a:ext>
+            </a:extLst>
+          </a:blip>
+          <a:srcRect/>
+          <a:stretch>
+            <a:fillRect/>
+          </a:stretch>
+        </p:blipFill>
+        <p:spPr bwMode="auto">
+          <a:xfrm>
+            <a:off x="0" y="-132736"/>
+            <a:ext cx="12192000" cy="7123471"/>
+          </a:xfrm>
+          <a:prstGeom prst="rect">
+            <a:avLst/>
+          </a:prstGeom>
+          <a:noFill/>
+          <a:extLst>
+            <a:ext uri="{909E8E84-426E-40DD-AFC4-6F175D3DCCD1}">
+              <a14:hiddenFill xmlns:a14="http://schemas.microsoft.com/office/drawing/2010/main">
+                <a:solidFill>
+                  <a:srgbClr val="FFFFFF"/>
+                </a:solidFill>
+              </a14:hiddenFill>
+            </a:ext>
+          </a:extLst>
+        </p:spPr>
+      </p:pic>
+      <p:sp>
+        <p:nvSpPr>
+          <p:cNvPr id="4" name="CuadroTexto 3">
+            <a:extLst>
+              <a:ext uri="{FF2B5EF4-FFF2-40B4-BE49-F238E27FC236}">
+                <a16:creationId xmlns:a16="http://schemas.microsoft.com/office/drawing/2014/main" id="{B70028D2-B23E-53C7-3732-FB97B92643F4}"/>
+              </a:ext>
+            </a:extLst>
+          </p:cNvPr>
+          <p:cNvSpPr txBox="1"/>
+          <p:nvPr/>
+        </p:nvSpPr>
+        <p:spPr>
+          <a:xfrm>
+            <a:off x="2227099" y="776418"/>
+            <a:ext cx="9696190" cy="584775"/>
+          </a:xfrm>
+          <a:prstGeom prst="rect">
+            <a:avLst/>
+          </a:prstGeom>
+          <a:noFill/>
+        </p:spPr>
+        <p:txBody>
+          <a:bodyPr wrap="square" rtlCol="0">
+            <a:spAutoFit/>
+          </a:bodyPr>
+          <a:lstStyle/>
+          <a:p>
+            <a:r>
+              <a:rPr lang="en-US" sz="3200" b="1" dirty="0">
+                <a:ln>
+                  <a:solidFill>
+                    <a:schemeClr val="bg1"/>
+                  </a:solidFill>
+                </a:ln>
+                <a:latin typeface="Arial" panose="020B0604020202020204" pitchFamily="34" charset="0"/>
+                <a:cs typeface="Arial" panose="020B0604020202020204" pitchFamily="34" charset="0"/>
+              </a:rPr>
+              <a:t>Create a custom method level Lint rule - Android</a:t>
+            </a:r>
+            <a:endParaRPr lang="es-MX" sz="3200" b="1" dirty="0">
+              <a:ln>
+                <a:solidFill>
+                  <a:schemeClr val="bg1"/>
+                </a:solidFill>
+              </a:ln>
+              <a:latin typeface="Arial" panose="020B0604020202020204" pitchFamily="34" charset="0"/>
+              <a:cs typeface="Arial" panose="020B0604020202020204" pitchFamily="34" charset="0"/>
+            </a:endParaRPr>
+          </a:p>
+        </p:txBody>
+      </p:sp>
+      <p:pic>
+        <p:nvPicPr>
+          <p:cNvPr id="5" name="Picture 2" descr="Farbiges iOS Logo Icon als PNG, SVG">
+            <a:extLst>
+              <a:ext uri="{FF2B5EF4-FFF2-40B4-BE49-F238E27FC236}">
+                <a16:creationId xmlns:a16="http://schemas.microsoft.com/office/drawing/2014/main" id="{0353ED7F-0CB7-6887-2E06-DEEDE1C08EE8}"/>
+              </a:ext>
+            </a:extLst>
+          </p:cNvPr>
+          <p:cNvPicPr>
+            <a:picLocks noChangeAspect="1" noChangeArrowheads="1"/>
+          </p:cNvPicPr>
+          <p:nvPr/>
+        </p:nvPicPr>
+        <p:blipFill>
+          <a:blip r:embed="rId3">
+            <a:extLst>
+              <a:ext uri="{28A0092B-C50C-407E-A947-70E740481C1C}">
+                <a14:useLocalDpi xmlns:a14="http://schemas.microsoft.com/office/drawing/2010/main" val="0"/>
+              </a:ext>
+            </a:extLst>
+          </a:blip>
+          <a:srcRect/>
+          <a:stretch>
+            <a:fillRect/>
+          </a:stretch>
+        </p:blipFill>
+        <p:spPr bwMode="auto">
+          <a:xfrm>
+            <a:off x="666984" y="390258"/>
+            <a:ext cx="1167581" cy="1167581"/>
+          </a:xfrm>
+          <a:prstGeom prst="rect">
+            <a:avLst/>
+          </a:prstGeom>
+          <a:noFill/>
+          <a:extLst>
+            <a:ext uri="{909E8E84-426E-40DD-AFC4-6F175D3DCCD1}">
+              <a14:hiddenFill xmlns:a14="http://schemas.microsoft.com/office/drawing/2010/main">
+                <a:solidFill>
+                  <a:srgbClr val="FFFFFF"/>
+                </a:solidFill>
+              </a14:hiddenFill>
+            </a:ext>
+          </a:extLst>
+        </p:spPr>
+      </p:pic>
+      <p:pic>
+        <p:nvPicPr>
+          <p:cNvPr id="6" name="Picture 4" descr="Swiftui Icon im Windows 11 Color-Stil">
+            <a:extLst>
+              <a:ext uri="{FF2B5EF4-FFF2-40B4-BE49-F238E27FC236}">
+                <a16:creationId xmlns:a16="http://schemas.microsoft.com/office/drawing/2014/main" id="{EA491DB6-FB8B-F6F7-B0C4-91E2FD8AFCAD}"/>
+              </a:ext>
+            </a:extLst>
+          </p:cNvPr>
+          <p:cNvPicPr>
+            <a:picLocks noChangeAspect="1" noChangeArrowheads="1"/>
+          </p:cNvPicPr>
+          <p:nvPr/>
+        </p:nvPicPr>
+        <p:blipFill>
+          <a:blip r:embed="rId4">
+            <a:extLst>
+              <a:ext uri="{28A0092B-C50C-407E-A947-70E740481C1C}">
+                <a14:useLocalDpi xmlns:a14="http://schemas.microsoft.com/office/drawing/2010/main" val="0"/>
+              </a:ext>
+            </a:extLst>
+          </a:blip>
+          <a:srcRect/>
+          <a:stretch>
+            <a:fillRect/>
+          </a:stretch>
+        </p:blipFill>
+        <p:spPr bwMode="auto">
+          <a:xfrm>
+            <a:off x="666984" y="1361193"/>
+            <a:ext cx="1167581" cy="1167581"/>
+          </a:xfrm>
+          <a:prstGeom prst="rect">
+            <a:avLst/>
+          </a:prstGeom>
+          <a:noFill/>
+          <a:extLst>
+            <a:ext uri="{909E8E84-426E-40DD-AFC4-6F175D3DCCD1}">
+              <a14:hiddenFill xmlns:a14="http://schemas.microsoft.com/office/drawing/2010/main">
+                <a:solidFill>
+                  <a:srgbClr val="FFFFFF"/>
+                </a:solidFill>
+              </a14:hiddenFill>
+            </a:ext>
+          </a:extLst>
+        </p:spPr>
+      </p:pic>
+      <p:pic>
+        <p:nvPicPr>
+          <p:cNvPr id="7" name="Picture 6" descr="Xcode - Wikipedia">
+            <a:extLst>
+              <a:ext uri="{FF2B5EF4-FFF2-40B4-BE49-F238E27FC236}">
+                <a16:creationId xmlns:a16="http://schemas.microsoft.com/office/drawing/2014/main" id="{00F1F672-BC50-FA7D-794D-3F86E68FBB04}"/>
+              </a:ext>
+            </a:extLst>
+          </p:cNvPr>
+          <p:cNvPicPr>
+            <a:picLocks noChangeAspect="1" noChangeArrowheads="1"/>
+          </p:cNvPicPr>
+          <p:nvPr/>
+        </p:nvPicPr>
+        <p:blipFill>
+          <a:blip r:embed="rId5">
+            <a:extLst>
+              <a:ext uri="{28A0092B-C50C-407E-A947-70E740481C1C}">
+                <a14:useLocalDpi xmlns:a14="http://schemas.microsoft.com/office/drawing/2010/main" val="0"/>
+              </a:ext>
+            </a:extLst>
+          </a:blip>
+          <a:srcRect/>
+          <a:stretch>
+            <a:fillRect/>
+          </a:stretch>
+        </p:blipFill>
+        <p:spPr bwMode="auto">
+          <a:xfrm>
+            <a:off x="642191" y="3552556"/>
+            <a:ext cx="1217166" cy="1217166"/>
+          </a:xfrm>
+          <a:prstGeom prst="rect">
+            <a:avLst/>
+          </a:prstGeom>
+          <a:noFill/>
+          <a:extLst>
+            <a:ext uri="{909E8E84-426E-40DD-AFC4-6F175D3DCCD1}">
+              <a14:hiddenFill xmlns:a14="http://schemas.microsoft.com/office/drawing/2010/main">
+                <a:solidFill>
+                  <a:srgbClr val="FFFFFF"/>
+                </a:solidFill>
+              </a14:hiddenFill>
+            </a:ext>
+          </a:extLst>
+        </p:spPr>
+      </p:pic>
+      <p:pic>
+        <p:nvPicPr>
+          <p:cNvPr id="1028" name="Picture 4" descr="UIkit Logo PNG Transparent &amp; SVG Vector - Freebie Supply">
+            <a:extLst>
+              <a:ext uri="{FF2B5EF4-FFF2-40B4-BE49-F238E27FC236}">
+                <a16:creationId xmlns:a16="http://schemas.microsoft.com/office/drawing/2014/main" id="{B37378BD-5853-97EA-92E7-9913ABAB7824}"/>
+              </a:ext>
+            </a:extLst>
+          </p:cNvPr>
+          <p:cNvPicPr>
+            <a:picLocks noChangeAspect="1" noChangeArrowheads="1"/>
+          </p:cNvPicPr>
+          <p:nvPr/>
+        </p:nvPicPr>
+        <p:blipFill>
+          <a:blip r:embed="rId6">
+            <a:extLst>
+              <a:ext uri="{28A0092B-C50C-407E-A947-70E740481C1C}">
+                <a14:useLocalDpi xmlns:a14="http://schemas.microsoft.com/office/drawing/2010/main" val="0"/>
+              </a:ext>
+            </a:extLst>
+          </a:blip>
+          <a:srcRect/>
+          <a:stretch>
+            <a:fillRect/>
+          </a:stretch>
+        </p:blipFill>
+        <p:spPr bwMode="auto">
+          <a:xfrm>
+            <a:off x="666984" y="2592028"/>
+            <a:ext cx="1115961" cy="836971"/>
+          </a:xfrm>
+          <a:prstGeom prst="rect">
+            <a:avLst/>
+          </a:prstGeom>
+          <a:noFill/>
+          <a:extLst>
+            <a:ext uri="{909E8E84-426E-40DD-AFC4-6F175D3DCCD1}">
+              <a14:hiddenFill xmlns:a14="http://schemas.microsoft.com/office/drawing/2010/main">
+                <a:solidFill>
+                  <a:srgbClr val="FFFFFF"/>
+                </a:solidFill>
+              </a14:hiddenFill>
+            </a:ext>
+          </a:extLst>
+        </p:spPr>
+      </p:pic>
+      <p:pic>
+        <p:nvPicPr>
+          <p:cNvPr id="9" name="Imagen 8" descr="Interfaz de usuario gráfica, Texto, Aplicación, Chat o mensaje de texto&#10;&#10;Descripción generada automáticamente">
+            <a:extLst>
+              <a:ext uri="{FF2B5EF4-FFF2-40B4-BE49-F238E27FC236}">
+                <a16:creationId xmlns:a16="http://schemas.microsoft.com/office/drawing/2014/main" id="{06B1DA1C-2CA1-0F6E-E78D-AF4887C2AF80}"/>
+              </a:ext>
+            </a:extLst>
+          </p:cNvPr>
+          <p:cNvPicPr>
+            <a:picLocks noChangeAspect="1"/>
+          </p:cNvPicPr>
+          <p:nvPr/>
+        </p:nvPicPr>
+        <p:blipFill>
+          <a:blip r:embed="rId7">
+            <a:extLst>
+              <a:ext uri="{28A0092B-C50C-407E-A947-70E740481C1C}">
+                <a14:useLocalDpi xmlns:a14="http://schemas.microsoft.com/office/drawing/2010/main" val="0"/>
+              </a:ext>
+            </a:extLst>
+          </a:blip>
+          <a:stretch>
+            <a:fillRect/>
+          </a:stretch>
+        </p:blipFill>
+        <p:spPr>
+          <a:xfrm>
+            <a:off x="4347355" y="1557839"/>
+            <a:ext cx="2292222" cy="4989871"/>
+          </a:xfrm>
+          <a:prstGeom prst="rect">
+            <a:avLst/>
+          </a:prstGeom>
+        </p:spPr>
+      </p:pic>
+      <p:pic>
+        <p:nvPicPr>
+          <p:cNvPr id="11" name="Imagen 10" descr="Interfaz de usuario gráfica&#10;&#10;Descripción generada automáticamente">
+            <a:extLst>
+              <a:ext uri="{FF2B5EF4-FFF2-40B4-BE49-F238E27FC236}">
+                <a16:creationId xmlns:a16="http://schemas.microsoft.com/office/drawing/2014/main" id="{DDA296D0-5E89-FFE7-C5FB-9A5775E92CF5}"/>
+              </a:ext>
+            </a:extLst>
+          </p:cNvPr>
+          <p:cNvPicPr>
+            <a:picLocks noChangeAspect="1"/>
+          </p:cNvPicPr>
+          <p:nvPr/>
+        </p:nvPicPr>
+        <p:blipFill>
+          <a:blip r:embed="rId8">
+            <a:extLst>
+              <a:ext uri="{28A0092B-C50C-407E-A947-70E740481C1C}">
+                <a14:useLocalDpi xmlns:a14="http://schemas.microsoft.com/office/drawing/2010/main" val="0"/>
+              </a:ext>
+            </a:extLst>
+          </a:blip>
+          <a:stretch>
+            <a:fillRect/>
+          </a:stretch>
+        </p:blipFill>
+        <p:spPr>
+          <a:xfrm>
+            <a:off x="7696622" y="1549890"/>
+            <a:ext cx="2292222" cy="4989871"/>
+          </a:xfrm>
+          <a:prstGeom prst="rect">
+            <a:avLst/>
+          </a:prstGeom>
+        </p:spPr>
+      </p:pic>
+    </p:spTree>
+    <p:extLst>
+      <p:ext uri="{BB962C8B-B14F-4D97-AF65-F5344CB8AC3E}">
+        <p14:creationId xmlns:p14="http://schemas.microsoft.com/office/powerpoint/2010/main" val="3566854015"/>
+      </p:ext>
+    </p:extLst>
+  </p:cSld>
+  <p:clrMapOvr>
+    <a:masterClrMapping/>
+  </p:clrMapOvr>
+</p:sld>
+</file>
+
 <file path=ppt/theme/theme1.xml><?xml version="1.0" encoding="utf-8"?>
 <a:theme xmlns:a="http://schemas.openxmlformats.org/drawingml/2006/main" name="Tema de Office">
   <a:themeElements>

</xml_diff>